<commit_message>
Changes to the master test plan and the TCMS presentation
1. Fixed minor mistakes in the master test plan
2. Added some famous users of Polarion
</commit_message>
<xml_diff>
--- a/06.Test Plan/TCMS Polarion.pptx
+++ b/06.Test Plan/TCMS Polarion.pptx
@@ -6245,6 +6245,66 @@
           </a:prstGeom>
         </p:spPr>
       </p:pic>
+      <p:pic>
+        <p:nvPicPr>
+          <p:cNvPr id="5" name="Picture 4"/>
+          <p:cNvPicPr>
+            <a:picLocks noChangeAspect="1"/>
+          </p:cNvPicPr>
+          <p:nvPr/>
+        </p:nvPicPr>
+        <p:blipFill>
+          <a:blip r:embed="rId3">
+            <a:extLst>
+              <a:ext uri="{28A0092B-C50C-407E-A947-70E740481C1C}">
+                <a14:useLocalDpi xmlns:a14="http://schemas.microsoft.com/office/drawing/2010/main" val="0"/>
+              </a:ext>
+            </a:extLst>
+          </a:blip>
+          <a:stretch>
+            <a:fillRect/>
+          </a:stretch>
+        </p:blipFill>
+        <p:spPr>
+          <a:xfrm>
+            <a:off x="677334" y="4898202"/>
+            <a:ext cx="7344800" cy="1143160"/>
+          </a:xfrm>
+          <a:prstGeom prst="rect">
+            <a:avLst/>
+          </a:prstGeom>
+        </p:spPr>
+      </p:pic>
+      <p:pic>
+        <p:nvPicPr>
+          <p:cNvPr id="6" name="Picture 5"/>
+          <p:cNvPicPr>
+            <a:picLocks noChangeAspect="1"/>
+          </p:cNvPicPr>
+          <p:nvPr/>
+        </p:nvPicPr>
+        <p:blipFill>
+          <a:blip r:embed="rId4">
+            <a:extLst>
+              <a:ext uri="{28A0092B-C50C-407E-A947-70E740481C1C}">
+                <a14:useLocalDpi xmlns:a14="http://schemas.microsoft.com/office/drawing/2010/main" val="0"/>
+              </a:ext>
+            </a:extLst>
+          </a:blip>
+          <a:stretch>
+            <a:fillRect/>
+          </a:stretch>
+        </p:blipFill>
+        <p:spPr>
+          <a:xfrm>
+            <a:off x="677334" y="3687050"/>
+            <a:ext cx="2362530" cy="1133633"/>
+          </a:xfrm>
+          <a:prstGeom prst="rect">
+            <a:avLst/>
+          </a:prstGeom>
+        </p:spPr>
+      </p:pic>
     </p:spTree>
     <p:extLst>
       <p:ext uri="{BB962C8B-B14F-4D97-AF65-F5344CB8AC3E}">

</xml_diff>

<commit_message>
Added negatives to the presentation
</commit_message>
<xml_diff>
--- a/06.Test Plan/TCMS Polarion.pptx
+++ b/06.Test Plan/TCMS Polarion.pptx
@@ -6188,7 +6188,7 @@
             </a:pPr>
             <a:r>
               <a:rPr lang="en-US" sz="2400" dirty="0" smtClean="0"/>
-              <a:t>Entirely web based</a:t>
+              <a:t>Web based</a:t>
             </a:r>
           </a:p>
           <a:p>
@@ -6198,7 +6198,11 @@
             </a:pPr>
             <a:r>
               <a:rPr lang="en-US" sz="2400" dirty="0" smtClean="0"/>
-              <a:t>One of three main products of </a:t>
+              <a:t>One </a:t>
+            </a:r>
+            <a:r>
+              <a:rPr lang="en-US" sz="2400" dirty="0" smtClean="0"/>
+              <a:t>of three main products of </a:t>
             </a:r>
             <a:r>
               <a:rPr lang="en-US" sz="2400" dirty="0" err="1" smtClean="0"/>
@@ -6782,14 +6786,25 @@
           <a:p>
             <a:r>
               <a:rPr lang="en-US" sz="2400" dirty="0" smtClean="0"/>
-              <a:t>It’s costly</a:t>
-            </a:r>
-          </a:p>
-          <a:p>
+              <a:t>It’s </a:t>
+            </a:r>
             <a:r>
               <a:rPr lang="en-US" sz="2400" dirty="0" smtClean="0"/>
-              <a:t>Web based</a:t>
-            </a:r>
+              <a:t>costly</a:t>
+            </a:r>
+          </a:p>
+          <a:p>
+            <a:r>
+              <a:rPr lang="en-US" sz="2400" dirty="0" smtClean="0"/>
+              <a:t>Non-tradition view</a:t>
+            </a:r>
+          </a:p>
+          <a:p>
+            <a:r>
+              <a:rPr lang="en-US" sz="2400" dirty="0" smtClean="0"/>
+              <a:t>Manual linking</a:t>
+            </a:r>
+            <a:endParaRPr lang="en-US" sz="2400" dirty="0" smtClean="0"/>
           </a:p>
           <a:p>
             <a:pPr marL="0" indent="0">
@@ -6821,7 +6836,7 @@
         </p:blipFill>
         <p:spPr>
           <a:xfrm>
-            <a:off x="4167516" y="2736887"/>
+            <a:off x="5429646" y="2865676"/>
             <a:ext cx="3675718" cy="3675718"/>
           </a:xfrm>
           <a:prstGeom prst="rect">

</xml_diff>

<commit_message>
Even more changes to the presentation
</commit_message>
<xml_diff>
--- a/06.Test Plan/TCMS Polarion.pptx
+++ b/06.Test Plan/TCMS Polarion.pptx
@@ -6198,11 +6198,7 @@
             </a:pPr>
             <a:r>
               <a:rPr lang="en-US" sz="2400" dirty="0" smtClean="0"/>
-              <a:t>One </a:t>
-            </a:r>
-            <a:r>
-              <a:rPr lang="en-US" sz="2400" dirty="0" smtClean="0"/>
-              <a:t>of three main products of </a:t>
+              <a:t>One of three main products of </a:t>
             </a:r>
             <a:r>
               <a:rPr lang="en-US" sz="2400" dirty="0" err="1" smtClean="0"/>
@@ -6786,11 +6782,7 @@
           <a:p>
             <a:r>
               <a:rPr lang="en-US" sz="2400" dirty="0" smtClean="0"/>
-              <a:t>It’s </a:t>
-            </a:r>
-            <a:r>
-              <a:rPr lang="en-US" sz="2400" dirty="0" smtClean="0"/>
-              <a:t>costly</a:t>
+              <a:t>It’s costly</a:t>
             </a:r>
           </a:p>
           <a:p>
@@ -6800,10 +6792,9 @@
             </a:r>
           </a:p>
           <a:p>
-            <a:r>
-              <a:rPr lang="en-US" sz="2400" dirty="0" smtClean="0"/>
-              <a:t>Manual linking</a:t>
-            </a:r>
+            <a:pPr marL="0" indent="0">
+              <a:buNone/>
+            </a:pPr>
             <a:endParaRPr lang="en-US" sz="2400" dirty="0" smtClean="0"/>
           </a:p>
           <a:p>

</xml_diff>